<commit_message>
add new spanish icon
</commit_message>
<xml_diff>
--- a/HymnIcons.pptx
+++ b/HymnIcons.pptx
@@ -106,6 +106,22 @@
       </a:defRPr>
     </a:lvl9pPr>
   </p:defaultTextStyle>
+  <p:extLst>
+    <p:ext uri="{EFAFB233-063F-42B5-8137-9DF3F51BA10A}">
+      <p15:sldGuideLst xmlns:p15="http://schemas.microsoft.com/office/powerpoint/2012/main">
+        <p15:guide id="1" orient="horz" pos="2160">
+          <p15:clr>
+            <a:srgbClr val="A4A3A4"/>
+          </p15:clr>
+        </p15:guide>
+        <p15:guide id="2" pos="2880">
+          <p15:clr>
+            <a:srgbClr val="A4A3A4"/>
+          </p15:clr>
+        </p15:guide>
+      </p15:sldGuideLst>
+    </p:ext>
+  </p:extLst>
 </p:presentation>
 </file>
 
@@ -290,7 +306,7 @@
           <a:p>
             <a:fld id="{477B3B45-EB55-46BF-8EE7-F91257854600}" type="datetimeFigureOut">
               <a:rPr lang="en-US" smtClean="0"/>
-              <a:t>19/12/15</a:t>
+              <a:t>8/1/2016</a:t>
             </a:fld>
             <a:endParaRPr lang="en-US"/>
           </a:p>
@@ -455,7 +471,7 @@
           <a:p>
             <a:fld id="{477B3B45-EB55-46BF-8EE7-F91257854600}" type="datetimeFigureOut">
               <a:rPr lang="en-US" smtClean="0"/>
-              <a:t>19/12/15</a:t>
+              <a:t>8/1/2016</a:t>
             </a:fld>
             <a:endParaRPr lang="en-US"/>
           </a:p>
@@ -630,7 +646,7 @@
           <a:p>
             <a:fld id="{477B3B45-EB55-46BF-8EE7-F91257854600}" type="datetimeFigureOut">
               <a:rPr lang="en-US" smtClean="0"/>
-              <a:t>19/12/15</a:t>
+              <a:t>8/1/2016</a:t>
             </a:fld>
             <a:endParaRPr lang="en-US"/>
           </a:p>
@@ -795,7 +811,7 @@
           <a:p>
             <a:fld id="{477B3B45-EB55-46BF-8EE7-F91257854600}" type="datetimeFigureOut">
               <a:rPr lang="en-US" smtClean="0"/>
-              <a:t>19/12/15</a:t>
+              <a:t>8/1/2016</a:t>
             </a:fld>
             <a:endParaRPr lang="en-US"/>
           </a:p>
@@ -1036,7 +1052,7 @@
           <a:p>
             <a:fld id="{477B3B45-EB55-46BF-8EE7-F91257854600}" type="datetimeFigureOut">
               <a:rPr lang="en-US" smtClean="0"/>
-              <a:t>19/12/15</a:t>
+              <a:t>8/1/2016</a:t>
             </a:fld>
             <a:endParaRPr lang="en-US"/>
           </a:p>
@@ -1319,7 +1335,7 @@
           <a:p>
             <a:fld id="{477B3B45-EB55-46BF-8EE7-F91257854600}" type="datetimeFigureOut">
               <a:rPr lang="en-US" smtClean="0"/>
-              <a:t>19/12/15</a:t>
+              <a:t>8/1/2016</a:t>
             </a:fld>
             <a:endParaRPr lang="en-US"/>
           </a:p>
@@ -1736,7 +1752,7 @@
           <a:p>
             <a:fld id="{477B3B45-EB55-46BF-8EE7-F91257854600}" type="datetimeFigureOut">
               <a:rPr lang="en-US" smtClean="0"/>
-              <a:t>19/12/15</a:t>
+              <a:t>8/1/2016</a:t>
             </a:fld>
             <a:endParaRPr lang="en-US"/>
           </a:p>
@@ -1849,7 +1865,7 @@
           <a:p>
             <a:fld id="{477B3B45-EB55-46BF-8EE7-F91257854600}" type="datetimeFigureOut">
               <a:rPr lang="en-US" smtClean="0"/>
-              <a:t>19/12/15</a:t>
+              <a:t>8/1/2016</a:t>
             </a:fld>
             <a:endParaRPr lang="en-US"/>
           </a:p>
@@ -1939,7 +1955,7 @@
           <a:p>
             <a:fld id="{477B3B45-EB55-46BF-8EE7-F91257854600}" type="datetimeFigureOut">
               <a:rPr lang="en-US" smtClean="0"/>
-              <a:t>19/12/15</a:t>
+              <a:t>8/1/2016</a:t>
             </a:fld>
             <a:endParaRPr lang="en-US"/>
           </a:p>
@@ -2211,7 +2227,7 @@
           <a:p>
             <a:fld id="{477B3B45-EB55-46BF-8EE7-F91257854600}" type="datetimeFigureOut">
               <a:rPr lang="en-US" smtClean="0"/>
-              <a:t>19/12/15</a:t>
+              <a:t>8/1/2016</a:t>
             </a:fld>
             <a:endParaRPr lang="en-US"/>
           </a:p>
@@ -2459,7 +2475,7 @@
           <a:p>
             <a:fld id="{477B3B45-EB55-46BF-8EE7-F91257854600}" type="datetimeFigureOut">
               <a:rPr lang="en-US" smtClean="0"/>
-              <a:t>19/12/15</a:t>
+              <a:t>8/1/2016</a:t>
             </a:fld>
             <a:endParaRPr lang="en-US"/>
           </a:p>
@@ -2667,7 +2683,7 @@
           <a:p>
             <a:fld id="{477B3B45-EB55-46BF-8EE7-F91257854600}" type="datetimeFigureOut">
               <a:rPr lang="en-US" smtClean="0"/>
-              <a:t>19/12/15</a:t>
+              <a:t>8/1/2016</a:t>
             </a:fld>
             <a:endParaRPr lang="en-US"/>
           </a:p>
@@ -3833,14 +3849,6 @@
               </a:rPr>
               <a:t>K</a:t>
             </a:r>
-            <a:endParaRPr lang="en-US" sz="9600" dirty="0">
-              <a:solidFill>
-                <a:schemeClr val="bg1">
-                  <a:lumMod val="95000"/>
-                </a:schemeClr>
-              </a:solidFill>
-              <a:latin typeface="Century" pitchFamily="18" charset="0"/>
-            </a:endParaRPr>
           </a:p>
         </p:txBody>
       </p:sp>
@@ -3882,6 +3890,124 @@
               <a:rPr lang="en-US" dirty="0" smtClean="0"/>
               <a:t>300 – A1887F</a:t>
             </a:r>
+          </a:p>
+        </p:txBody>
+      </p:sp>
+      <p:sp>
+        <p:nvSpPr>
+          <p:cNvPr id="6" name="Rounded Rectangle 5"/>
+          <p:cNvSpPr/>
+          <p:nvPr/>
+        </p:nvSpPr>
+        <p:spPr>
+          <a:xfrm>
+            <a:off x="1155551" y="3352800"/>
+            <a:ext cx="2057400" cy="2057400"/>
+          </a:xfrm>
+          <a:prstGeom prst="roundRect">
+            <a:avLst/>
+          </a:prstGeom>
+          <a:solidFill>
+            <a:srgbClr val="7986CB"/>
+          </a:solidFill>
+          <a:ln w="76200">
+            <a:solidFill>
+              <a:srgbClr val="3F51B5"/>
+            </a:solidFill>
+          </a:ln>
+        </p:spPr>
+        <p:style>
+          <a:lnRef idx="1">
+            <a:schemeClr val="dk1"/>
+          </a:lnRef>
+          <a:fillRef idx="2">
+            <a:schemeClr val="dk1"/>
+          </a:fillRef>
+          <a:effectRef idx="1">
+            <a:schemeClr val="dk1"/>
+          </a:effectRef>
+          <a:fontRef idx="minor">
+            <a:schemeClr val="dk1"/>
+          </a:fontRef>
+        </p:style>
+        <p:txBody>
+          <a:bodyPr rtlCol="0" anchor="ctr">
+            <a:normAutofit/>
+          </a:bodyPr>
+          <a:lstStyle/>
+          <a:p>
+            <a:pPr algn="ctr"/>
+            <a:r>
+              <a:rPr lang="en-US" sz="9600" dirty="0">
+                <a:solidFill>
+                  <a:schemeClr val="bg1">
+                    <a:lumMod val="95000"/>
+                  </a:schemeClr>
+                </a:solidFill>
+                <a:latin typeface="Century" pitchFamily="18" charset="0"/>
+              </a:rPr>
+              <a:t>S</a:t>
+            </a:r>
+            <a:endParaRPr lang="en-US" sz="9600" dirty="0">
+              <a:solidFill>
+                <a:schemeClr val="bg1">
+                  <a:lumMod val="95000"/>
+                </a:schemeClr>
+              </a:solidFill>
+              <a:latin typeface="Century" pitchFamily="18" charset="0"/>
+            </a:endParaRPr>
+          </a:p>
+        </p:txBody>
+      </p:sp>
+      <p:sp>
+        <p:nvSpPr>
+          <p:cNvPr id="7" name="TextBox 6"/>
+          <p:cNvSpPr txBox="1"/>
+          <p:nvPr/>
+        </p:nvSpPr>
+        <p:spPr>
+          <a:xfrm>
+            <a:off x="3962400" y="3733800"/>
+            <a:ext cx="3276600" cy="923330"/>
+          </a:xfrm>
+          <a:prstGeom prst="rect">
+            <a:avLst/>
+          </a:prstGeom>
+          <a:noFill/>
+        </p:spPr>
+        <p:txBody>
+          <a:bodyPr wrap="square" rtlCol="0">
+            <a:spAutoFit/>
+          </a:bodyPr>
+          <a:lstStyle/>
+          <a:p>
+            <a:r>
+              <a:rPr lang="en-US" dirty="0" smtClean="0"/>
+              <a:t>Indigo – </a:t>
+            </a:r>
+            <a:endParaRPr lang="en-US" dirty="0" smtClean="0"/>
+          </a:p>
+          <a:p>
+            <a:r>
+              <a:rPr lang="en-US" dirty="0" smtClean="0"/>
+              <a:t>500 – </a:t>
+            </a:r>
+            <a:r>
+              <a:rPr lang="en-SG" dirty="0" smtClean="0"/>
+              <a:t>3f51b5 – 63 81 181</a:t>
+            </a:r>
+            <a:endParaRPr lang="en-US" dirty="0" smtClean="0"/>
+          </a:p>
+          <a:p>
+            <a:r>
+              <a:rPr lang="en-US" dirty="0" smtClean="0"/>
+              <a:t>300 – </a:t>
+            </a:r>
+            <a:r>
+              <a:rPr lang="en-SG" dirty="0" smtClean="0"/>
+              <a:t>7986cb – 121 134 203</a:t>
+            </a:r>
+            <a:endParaRPr lang="en-US" dirty="0" smtClean="0"/>
           </a:p>
         </p:txBody>
       </p:sp>

</xml_diff>

<commit_message>
add german icons and color theme.
</commit_message>
<xml_diff>
--- a/HymnIcons.pptx
+++ b/HymnIcons.pptx
@@ -8,6 +8,7 @@
     <p:sldId id="256" r:id="rId2"/>
     <p:sldId id="257" r:id="rId3"/>
     <p:sldId id="258" r:id="rId4"/>
+    <p:sldId id="259" r:id="rId5"/>
   </p:sldIdLst>
   <p:sldSz cx="9144000" cy="6858000" type="screen4x3"/>
   <p:notesSz cx="6858000" cy="9144000"/>
@@ -108,7 +109,7 @@
   </p:defaultTextStyle>
   <p:extLst>
     <p:ext uri="{EFAFB233-063F-42B5-8137-9DF3F51BA10A}">
-      <p15:sldGuideLst xmlns:p15="http://schemas.microsoft.com/office/powerpoint/2012/main">
+      <p15:sldGuideLst xmlns:p15="http://schemas.microsoft.com/office/powerpoint/2012/main" xmlns="">
         <p15:guide id="1" orient="horz" pos="2160">
           <p15:clr>
             <a:srgbClr val="A4A3A4"/>
@@ -306,7 +307,7 @@
           <a:p>
             <a:fld id="{477B3B45-EB55-46BF-8EE7-F91257854600}" type="datetimeFigureOut">
               <a:rPr lang="en-US" smtClean="0"/>
-              <a:t>8/1/2016</a:t>
+              <a:t>19/4/17</a:t>
             </a:fld>
             <a:endParaRPr lang="en-US"/>
           </a:p>
@@ -471,7 +472,7 @@
           <a:p>
             <a:fld id="{477B3B45-EB55-46BF-8EE7-F91257854600}" type="datetimeFigureOut">
               <a:rPr lang="en-US" smtClean="0"/>
-              <a:t>8/1/2016</a:t>
+              <a:t>19/4/17</a:t>
             </a:fld>
             <a:endParaRPr lang="en-US"/>
           </a:p>
@@ -646,7 +647,7 @@
           <a:p>
             <a:fld id="{477B3B45-EB55-46BF-8EE7-F91257854600}" type="datetimeFigureOut">
               <a:rPr lang="en-US" smtClean="0"/>
-              <a:t>8/1/2016</a:t>
+              <a:t>19/4/17</a:t>
             </a:fld>
             <a:endParaRPr lang="en-US"/>
           </a:p>
@@ -811,7 +812,7 @@
           <a:p>
             <a:fld id="{477B3B45-EB55-46BF-8EE7-F91257854600}" type="datetimeFigureOut">
               <a:rPr lang="en-US" smtClean="0"/>
-              <a:t>8/1/2016</a:t>
+              <a:t>19/4/17</a:t>
             </a:fld>
             <a:endParaRPr lang="en-US"/>
           </a:p>
@@ -1052,7 +1053,7 @@
           <a:p>
             <a:fld id="{477B3B45-EB55-46BF-8EE7-F91257854600}" type="datetimeFigureOut">
               <a:rPr lang="en-US" smtClean="0"/>
-              <a:t>8/1/2016</a:t>
+              <a:t>19/4/17</a:t>
             </a:fld>
             <a:endParaRPr lang="en-US"/>
           </a:p>
@@ -1335,7 +1336,7 @@
           <a:p>
             <a:fld id="{477B3B45-EB55-46BF-8EE7-F91257854600}" type="datetimeFigureOut">
               <a:rPr lang="en-US" smtClean="0"/>
-              <a:t>8/1/2016</a:t>
+              <a:t>19/4/17</a:t>
             </a:fld>
             <a:endParaRPr lang="en-US"/>
           </a:p>
@@ -1752,7 +1753,7 @@
           <a:p>
             <a:fld id="{477B3B45-EB55-46BF-8EE7-F91257854600}" type="datetimeFigureOut">
               <a:rPr lang="en-US" smtClean="0"/>
-              <a:t>8/1/2016</a:t>
+              <a:t>19/4/17</a:t>
             </a:fld>
             <a:endParaRPr lang="en-US"/>
           </a:p>
@@ -1865,7 +1866,7 @@
           <a:p>
             <a:fld id="{477B3B45-EB55-46BF-8EE7-F91257854600}" type="datetimeFigureOut">
               <a:rPr lang="en-US" smtClean="0"/>
-              <a:t>8/1/2016</a:t>
+              <a:t>19/4/17</a:t>
             </a:fld>
             <a:endParaRPr lang="en-US"/>
           </a:p>
@@ -1955,7 +1956,7 @@
           <a:p>
             <a:fld id="{477B3B45-EB55-46BF-8EE7-F91257854600}" type="datetimeFigureOut">
               <a:rPr lang="en-US" smtClean="0"/>
-              <a:t>8/1/2016</a:t>
+              <a:t>19/4/17</a:t>
             </a:fld>
             <a:endParaRPr lang="en-US"/>
           </a:p>
@@ -2227,7 +2228,7 @@
           <a:p>
             <a:fld id="{477B3B45-EB55-46BF-8EE7-F91257854600}" type="datetimeFigureOut">
               <a:rPr lang="en-US" smtClean="0"/>
-              <a:t>8/1/2016</a:t>
+              <a:t>19/4/17</a:t>
             </a:fld>
             <a:endParaRPr lang="en-US"/>
           </a:p>
@@ -2475,7 +2476,7 @@
           <a:p>
             <a:fld id="{477B3B45-EB55-46BF-8EE7-F91257854600}" type="datetimeFigureOut">
               <a:rPr lang="en-US" smtClean="0"/>
-              <a:t>8/1/2016</a:t>
+              <a:t>19/4/17</a:t>
             </a:fld>
             <a:endParaRPr lang="en-US"/>
           </a:p>
@@ -2683,7 +2684,7 @@
           <a:p>
             <a:fld id="{477B3B45-EB55-46BF-8EE7-F91257854600}" type="datetimeFigureOut">
               <a:rPr lang="en-US" smtClean="0"/>
-              <a:t>8/1/2016</a:t>
+              <a:t>19/4/17</a:t>
             </a:fld>
             <a:endParaRPr lang="en-US"/>
           </a:p>
@@ -3948,14 +3949,6 @@
               </a:rPr>
               <a:t>S</a:t>
             </a:r>
-            <a:endParaRPr lang="en-US" sz="9600" dirty="0">
-              <a:solidFill>
-                <a:schemeClr val="bg1">
-                  <a:lumMod val="95000"/>
-                </a:schemeClr>
-              </a:solidFill>
-              <a:latin typeface="Century" pitchFamily="18" charset="0"/>
-            </a:endParaRPr>
           </a:p>
         </p:txBody>
       </p:sp>
@@ -3985,7 +3978,6 @@
               <a:rPr lang="en-US" dirty="0" smtClean="0"/>
               <a:t>Indigo – </a:t>
             </a:r>
-            <a:endParaRPr lang="en-US" dirty="0" smtClean="0"/>
           </a:p>
           <a:p>
             <a:r>
@@ -4015,6 +4007,158 @@
     <p:extLst>
       <p:ext uri="{BB962C8B-B14F-4D97-AF65-F5344CB8AC3E}">
         <p14:creationId xmlns:p14="http://schemas.microsoft.com/office/powerpoint/2010/main" val="1929718000"/>
+      </p:ext>
+    </p:extLst>
+  </p:cSld>
+  <p:clrMapOvr>
+    <a:masterClrMapping/>
+  </p:clrMapOvr>
+</p:sld>
+</file>
+
+<file path=ppt/slides/slide4.xml><?xml version="1.0" encoding="utf-8"?>
+<p:sld xmlns:a="http://schemas.openxmlformats.org/drawingml/2006/main" xmlns:r="http://schemas.openxmlformats.org/officeDocument/2006/relationships" xmlns:p="http://schemas.openxmlformats.org/presentationml/2006/main">
+  <p:cSld>
+    <p:spTree>
+      <p:nvGrpSpPr>
+        <p:cNvPr id="1" name=""/>
+        <p:cNvGrpSpPr/>
+        <p:nvPr/>
+      </p:nvGrpSpPr>
+      <p:grpSpPr>
+        <a:xfrm>
+          <a:off x="0" y="0"/>
+          <a:ext cx="0" cy="0"/>
+          <a:chOff x="0" y="0"/>
+          <a:chExt cx="0" cy="0"/>
+        </a:xfrm>
+      </p:grpSpPr>
+      <p:sp>
+        <p:nvSpPr>
+          <p:cNvPr id="4" name="Rounded Rectangle 3"/>
+          <p:cNvSpPr/>
+          <p:nvPr/>
+        </p:nvSpPr>
+        <p:spPr>
+          <a:xfrm>
+            <a:off x="1155551" y="3352800"/>
+            <a:ext cx="2057400" cy="2057400"/>
+          </a:xfrm>
+          <a:prstGeom prst="roundRect">
+            <a:avLst/>
+          </a:prstGeom>
+          <a:solidFill>
+            <a:srgbClr val="FF8A65"/>
+          </a:solidFill>
+          <a:ln w="76200">
+            <a:solidFill>
+              <a:srgbClr val="FF5722"/>
+            </a:solidFill>
+          </a:ln>
+        </p:spPr>
+        <p:style>
+          <a:lnRef idx="1">
+            <a:schemeClr val="dk1"/>
+          </a:lnRef>
+          <a:fillRef idx="2">
+            <a:schemeClr val="dk1"/>
+          </a:fillRef>
+          <a:effectRef idx="1">
+            <a:schemeClr val="dk1"/>
+          </a:effectRef>
+          <a:fontRef idx="minor">
+            <a:schemeClr val="dk1"/>
+          </a:fontRef>
+        </p:style>
+        <p:txBody>
+          <a:bodyPr rtlCol="0" anchor="ctr">
+            <a:normAutofit/>
+          </a:bodyPr>
+          <a:lstStyle/>
+          <a:p>
+            <a:pPr algn="ctr"/>
+            <a:r>
+              <a:rPr lang="en-US" sz="9600" dirty="0">
+                <a:solidFill>
+                  <a:schemeClr val="bg1">
+                    <a:lumMod val="95000"/>
+                  </a:schemeClr>
+                </a:solidFill>
+                <a:latin typeface="Century" pitchFamily="18" charset="0"/>
+              </a:rPr>
+              <a:t>G</a:t>
+            </a:r>
+            <a:endParaRPr lang="en-US" sz="9600" dirty="0">
+              <a:solidFill>
+                <a:schemeClr val="bg1">
+                  <a:lumMod val="95000"/>
+                </a:schemeClr>
+              </a:solidFill>
+              <a:latin typeface="Century" pitchFamily="18" charset="0"/>
+            </a:endParaRPr>
+          </a:p>
+        </p:txBody>
+      </p:sp>
+      <p:sp>
+        <p:nvSpPr>
+          <p:cNvPr id="5" name="TextBox 4"/>
+          <p:cNvSpPr txBox="1"/>
+          <p:nvPr/>
+        </p:nvSpPr>
+        <p:spPr>
+          <a:xfrm>
+            <a:off x="3962400" y="3733800"/>
+            <a:ext cx="3276600" cy="923330"/>
+          </a:xfrm>
+          <a:prstGeom prst="rect">
+            <a:avLst/>
+          </a:prstGeom>
+          <a:noFill/>
+        </p:spPr>
+        <p:txBody>
+          <a:bodyPr wrap="square" rtlCol="0">
+            <a:spAutoFit/>
+          </a:bodyPr>
+          <a:lstStyle/>
+          <a:p>
+            <a:r>
+              <a:rPr lang="en-US" dirty="0" smtClean="0"/>
+              <a:t>Deep orange</a:t>
+            </a:r>
+            <a:r>
+              <a:rPr lang="en-US" dirty="0" smtClean="0"/>
+              <a:t>– </a:t>
+            </a:r>
+            <a:endParaRPr lang="en-US" dirty="0" smtClean="0"/>
+          </a:p>
+          <a:p>
+            <a:r>
+              <a:rPr lang="en-US" dirty="0" smtClean="0"/>
+              <a:t>500 </a:t>
+            </a:r>
+            <a:r>
+              <a:rPr lang="x-none" dirty="0" smtClean="0"/>
+              <a:t> - ff5722</a:t>
+            </a:r>
+            <a:endParaRPr lang="en-US" dirty="0" smtClean="0"/>
+          </a:p>
+          <a:p>
+            <a:r>
+              <a:rPr lang="en-US" dirty="0" smtClean="0"/>
+              <a:t>300 – </a:t>
+            </a:r>
+            <a:r>
+              <a:rPr lang="en-SG" dirty="0" smtClean="0"/>
+              <a:t>ff8a65</a:t>
+            </a:r>
+            <a:endParaRPr lang="en-US" dirty="0" smtClean="0"/>
+          </a:p>
+        </p:txBody>
+      </p:sp>
+    </p:spTree>
+    <p:extLst>
+      <p:ext uri="{BB962C8B-B14F-4D97-AF65-F5344CB8AC3E}">
+        <p14:creationId xmlns:p14="http://schemas.microsoft.com/office/powerpoint/2010/main" val="285577697"/>
       </p:ext>
     </p:extLst>
   </p:cSld>

</xml_diff>

<commit_message>
fix simplified chinese typos
</commit_message>
<xml_diff>
--- a/HymnIcons.pptx
+++ b/HymnIcons.pptx
@@ -5,7 +5,7 @@
     <p:sldMasterId id="2147483648" r:id="rId1"/>
   </p:sldMasterIdLst>
   <p:notesMasterIdLst>
-    <p:notesMasterId r:id="rId8"/>
+    <p:notesMasterId r:id="rId9"/>
   </p:notesMasterIdLst>
   <p:sldIdLst>
     <p:sldId id="256" r:id="rId2"/>
@@ -14,6 +14,7 @@
     <p:sldId id="259" r:id="rId5"/>
     <p:sldId id="261" r:id="rId6"/>
     <p:sldId id="263" r:id="rId7"/>
+    <p:sldId id="264" r:id="rId8"/>
   </p:sldIdLst>
   <p:sldSz cx="9144000" cy="6858000" type="screen4x3"/>
   <p:notesSz cx="6858000" cy="9144000"/>
@@ -213,7 +214,7 @@
           <a:p>
             <a:fld id="{EF9CD902-8637-1048-BDEB-F124F7F64116}" type="datetimeFigureOut">
               <a:rPr lang="en-US" smtClean="0"/>
-              <a:t>6/18/19</a:t>
+              <a:t>3/14/2020</a:t>
             </a:fld>
             <a:endParaRPr lang="en-US"/>
           </a:p>
@@ -743,7 +744,7 @@
           <a:p>
             <a:fld id="{477B3B45-EB55-46BF-8EE7-F91257854600}" type="datetimeFigureOut">
               <a:rPr lang="en-US" smtClean="0"/>
-              <a:t>6/18/19</a:t>
+              <a:t>3/14/2020</a:t>
             </a:fld>
             <a:endParaRPr lang="en-US"/>
           </a:p>
@@ -906,7 +907,7 @@
           <a:p>
             <a:fld id="{477B3B45-EB55-46BF-8EE7-F91257854600}" type="datetimeFigureOut">
               <a:rPr lang="en-US" smtClean="0"/>
-              <a:t>6/18/19</a:t>
+              <a:t>3/14/2020</a:t>
             </a:fld>
             <a:endParaRPr lang="en-US"/>
           </a:p>
@@ -1079,7 +1080,7 @@
           <a:p>
             <a:fld id="{477B3B45-EB55-46BF-8EE7-F91257854600}" type="datetimeFigureOut">
               <a:rPr lang="en-US" smtClean="0"/>
-              <a:t>6/18/19</a:t>
+              <a:t>3/14/2020</a:t>
             </a:fld>
             <a:endParaRPr lang="en-US"/>
           </a:p>
@@ -1242,7 +1243,7 @@
           <a:p>
             <a:fld id="{477B3B45-EB55-46BF-8EE7-F91257854600}" type="datetimeFigureOut">
               <a:rPr lang="en-US" smtClean="0"/>
-              <a:t>6/18/19</a:t>
+              <a:t>3/14/2020</a:t>
             </a:fld>
             <a:endParaRPr lang="en-US"/>
           </a:p>
@@ -1482,7 +1483,7 @@
           <a:p>
             <a:fld id="{477B3B45-EB55-46BF-8EE7-F91257854600}" type="datetimeFigureOut">
               <a:rPr lang="en-US" smtClean="0"/>
-              <a:t>6/18/19</a:t>
+              <a:t>3/14/2020</a:t>
             </a:fld>
             <a:endParaRPr lang="en-US"/>
           </a:p>
@@ -1762,7 +1763,7 @@
           <a:p>
             <a:fld id="{477B3B45-EB55-46BF-8EE7-F91257854600}" type="datetimeFigureOut">
               <a:rPr lang="en-US" smtClean="0"/>
-              <a:t>6/18/19</a:t>
+              <a:t>3/14/2020</a:t>
             </a:fld>
             <a:endParaRPr lang="en-US"/>
           </a:p>
@@ -2176,7 +2177,7 @@
           <a:p>
             <a:fld id="{477B3B45-EB55-46BF-8EE7-F91257854600}" type="datetimeFigureOut">
               <a:rPr lang="en-US" smtClean="0"/>
-              <a:t>6/18/19</a:t>
+              <a:t>3/14/2020</a:t>
             </a:fld>
             <a:endParaRPr lang="en-US"/>
           </a:p>
@@ -2288,7 +2289,7 @@
           <a:p>
             <a:fld id="{477B3B45-EB55-46BF-8EE7-F91257854600}" type="datetimeFigureOut">
               <a:rPr lang="en-US" smtClean="0"/>
-              <a:t>6/18/19</a:t>
+              <a:t>3/14/2020</a:t>
             </a:fld>
             <a:endParaRPr lang="en-US"/>
           </a:p>
@@ -2378,7 +2379,7 @@
           <a:p>
             <a:fld id="{477B3B45-EB55-46BF-8EE7-F91257854600}" type="datetimeFigureOut">
               <a:rPr lang="en-US" smtClean="0"/>
-              <a:t>6/18/19</a:t>
+              <a:t>3/14/2020</a:t>
             </a:fld>
             <a:endParaRPr lang="en-US"/>
           </a:p>
@@ -2648,7 +2649,7 @@
           <a:p>
             <a:fld id="{477B3B45-EB55-46BF-8EE7-F91257854600}" type="datetimeFigureOut">
               <a:rPr lang="en-US" smtClean="0"/>
-              <a:t>6/18/19</a:t>
+              <a:t>3/14/2020</a:t>
             </a:fld>
             <a:endParaRPr lang="en-US"/>
           </a:p>
@@ -2895,7 +2896,7 @@
           <a:p>
             <a:fld id="{477B3B45-EB55-46BF-8EE7-F91257854600}" type="datetimeFigureOut">
               <a:rPr lang="en-US" smtClean="0"/>
-              <a:t>6/18/19</a:t>
+              <a:t>3/14/2020</a:t>
             </a:fld>
             <a:endParaRPr lang="en-US"/>
           </a:p>
@@ -3101,7 +3102,7 @@
           <a:p>
             <a:fld id="{477B3B45-EB55-46BF-8EE7-F91257854600}" type="datetimeFigureOut">
               <a:rPr lang="en-US" smtClean="0"/>
-              <a:t>6/18/19</a:t>
+              <a:t>3/14/2020</a:t>
             </a:fld>
             <a:endParaRPr lang="en-US"/>
           </a:p>
@@ -5522,6 +5523,164 @@
     <p:extLst>
       <p:ext uri="{BB962C8B-B14F-4D97-AF65-F5344CB8AC3E}">
         <p14:creationId xmlns:p14="http://schemas.microsoft.com/office/powerpoint/2010/main" val="765545841"/>
+      </p:ext>
+    </p:extLst>
+  </p:cSld>
+  <p:clrMapOvr>
+    <a:masterClrMapping/>
+  </p:clrMapOvr>
+</p:sld>
+</file>
+
+<file path=ppt/slides/slide7.xml><?xml version="1.0" encoding="utf-8"?>
+<p:sld xmlns:a="http://schemas.openxmlformats.org/drawingml/2006/main" xmlns:r="http://schemas.openxmlformats.org/officeDocument/2006/relationships" xmlns:p="http://schemas.openxmlformats.org/presentationml/2006/main">
+  <p:cSld>
+    <p:spTree>
+      <p:nvGrpSpPr>
+        <p:cNvPr id="1" name=""/>
+        <p:cNvGrpSpPr/>
+        <p:nvPr/>
+      </p:nvGrpSpPr>
+      <p:grpSpPr>
+        <a:xfrm>
+          <a:off x="0" y="0"/>
+          <a:ext cx="0" cy="0"/>
+          <a:chOff x="0" y="0"/>
+          <a:chExt cx="0" cy="0"/>
+        </a:xfrm>
+      </p:grpSpPr>
+      <p:sp>
+        <p:nvSpPr>
+          <p:cNvPr id="4" name="Rounded Rectangle 5">
+            <a:extLst>
+              <a:ext uri="{FF2B5EF4-FFF2-40B4-BE49-F238E27FC236}">
+                <a16:creationId xmlns:a16="http://schemas.microsoft.com/office/drawing/2014/main" id="{CCAEA925-729D-4EFC-AA83-849DA81E7F9F}"/>
+              </a:ext>
+            </a:extLst>
+          </p:cNvPr>
+          <p:cNvSpPr/>
+          <p:nvPr/>
+        </p:nvSpPr>
+        <p:spPr>
+          <a:xfrm>
+            <a:off x="3810000" y="800100"/>
+            <a:ext cx="2057400" cy="2057400"/>
+          </a:xfrm>
+          <a:prstGeom prst="roundRect">
+            <a:avLst/>
+          </a:prstGeom>
+          <a:solidFill>
+            <a:srgbClr val="AA78CC"/>
+          </a:solidFill>
+          <a:ln w="76200">
+            <a:solidFill>
+              <a:srgbClr val="9933CC"/>
+            </a:solidFill>
+          </a:ln>
+        </p:spPr>
+        <p:style>
+          <a:lnRef idx="1">
+            <a:schemeClr val="dk1"/>
+          </a:lnRef>
+          <a:fillRef idx="2">
+            <a:schemeClr val="dk1"/>
+          </a:fillRef>
+          <a:effectRef idx="1">
+            <a:schemeClr val="dk1"/>
+          </a:effectRef>
+          <a:fontRef idx="minor">
+            <a:schemeClr val="dk1"/>
+          </a:fontRef>
+        </p:style>
+        <p:txBody>
+          <a:bodyPr rtlCol="0" anchor="ctr"/>
+          <a:lstStyle/>
+          <a:p>
+            <a:pPr algn="ctr"/>
+            <a:r>
+              <a:rPr lang="en-US" sz="9600" dirty="0">
+                <a:solidFill>
+                  <a:schemeClr val="bg1">
+                    <a:lumMod val="95000"/>
+                  </a:schemeClr>
+                </a:solidFill>
+                <a:latin typeface="Century" pitchFamily="18" charset="0"/>
+              </a:rPr>
+              <a:t>ZS</a:t>
+            </a:r>
+          </a:p>
+        </p:txBody>
+      </p:sp>
+      <p:sp>
+        <p:nvSpPr>
+          <p:cNvPr id="5" name="Rounded Rectangle 7">
+            <a:extLst>
+              <a:ext uri="{FF2B5EF4-FFF2-40B4-BE49-F238E27FC236}">
+                <a16:creationId xmlns:a16="http://schemas.microsoft.com/office/drawing/2014/main" id="{3844E2A3-CAB1-4DCF-A73C-2677FB58283D}"/>
+              </a:ext>
+            </a:extLst>
+          </p:cNvPr>
+          <p:cNvSpPr>
+            <a:spLocks/>
+          </p:cNvSpPr>
+          <p:nvPr/>
+        </p:nvSpPr>
+        <p:spPr>
+          <a:xfrm>
+            <a:off x="914400" y="800100"/>
+            <a:ext cx="2057400" cy="2057400"/>
+          </a:xfrm>
+          <a:prstGeom prst="roundRect">
+            <a:avLst/>
+          </a:prstGeom>
+          <a:solidFill>
+            <a:srgbClr val="99BB33"/>
+          </a:solidFill>
+          <a:ln w="76200">
+            <a:solidFill>
+              <a:srgbClr val="669900"/>
+            </a:solidFill>
+          </a:ln>
+        </p:spPr>
+        <p:style>
+          <a:lnRef idx="1">
+            <a:schemeClr val="dk1"/>
+          </a:lnRef>
+          <a:fillRef idx="2">
+            <a:schemeClr val="dk1"/>
+          </a:fillRef>
+          <a:effectRef idx="1">
+            <a:schemeClr val="dk1"/>
+          </a:effectRef>
+          <a:fontRef idx="minor">
+            <a:schemeClr val="dk1"/>
+          </a:fontRef>
+        </p:style>
+        <p:txBody>
+          <a:bodyPr lIns="91440" rtlCol="0" anchor="ctr">
+            <a:normAutofit lnSpcReduction="10000"/>
+          </a:bodyPr>
+          <a:lstStyle/>
+          <a:p>
+            <a:pPr algn="ctr"/>
+            <a:r>
+              <a:rPr lang="en-US" sz="12000" dirty="0">
+                <a:solidFill>
+                  <a:schemeClr val="bg1">
+                    <a:lumMod val="95000"/>
+                  </a:schemeClr>
+                </a:solidFill>
+                <a:latin typeface="Century" pitchFamily="18" charset="0"/>
+              </a:rPr>
+              <a:t>Z</a:t>
+            </a:r>
+          </a:p>
+        </p:txBody>
+      </p:sp>
+    </p:spTree>
+    <p:extLst>
+      <p:ext uri="{BB962C8B-B14F-4D97-AF65-F5344CB8AC3E}">
+        <p14:creationId xmlns:p14="http://schemas.microsoft.com/office/powerpoint/2010/main" val="342783128"/>
       </p:ext>
     </p:extLst>
   </p:cSld>

</xml_diff>

<commit_message>
Farsi with Right alignment
</commit_message>
<xml_diff>
--- a/HymnIcons.pptx
+++ b/HymnIcons.pptx
@@ -214,7 +214,7 @@
           <a:p>
             <a:fld id="{EF9CD902-8637-1048-BDEB-F124F7F64116}" type="datetimeFigureOut">
               <a:rPr lang="en-US" smtClean="0"/>
-              <a:t>5/9/2020</a:t>
+              <a:t>10/10/2020</a:t>
             </a:fld>
             <a:endParaRPr lang="en-US"/>
           </a:p>
@@ -744,7 +744,7 @@
           <a:p>
             <a:fld id="{477B3B45-EB55-46BF-8EE7-F91257854600}" type="datetimeFigureOut">
               <a:rPr lang="en-US" smtClean="0"/>
-              <a:t>5/9/2020</a:t>
+              <a:t>10/10/2020</a:t>
             </a:fld>
             <a:endParaRPr lang="en-US"/>
           </a:p>
@@ -907,7 +907,7 @@
           <a:p>
             <a:fld id="{477B3B45-EB55-46BF-8EE7-F91257854600}" type="datetimeFigureOut">
               <a:rPr lang="en-US" smtClean="0"/>
-              <a:t>5/9/2020</a:t>
+              <a:t>10/10/2020</a:t>
             </a:fld>
             <a:endParaRPr lang="en-US"/>
           </a:p>
@@ -1080,7 +1080,7 @@
           <a:p>
             <a:fld id="{477B3B45-EB55-46BF-8EE7-F91257854600}" type="datetimeFigureOut">
               <a:rPr lang="en-US" smtClean="0"/>
-              <a:t>5/9/2020</a:t>
+              <a:t>10/10/2020</a:t>
             </a:fld>
             <a:endParaRPr lang="en-US"/>
           </a:p>
@@ -1243,7 +1243,7 @@
           <a:p>
             <a:fld id="{477B3B45-EB55-46BF-8EE7-F91257854600}" type="datetimeFigureOut">
               <a:rPr lang="en-US" smtClean="0"/>
-              <a:t>5/9/2020</a:t>
+              <a:t>10/10/2020</a:t>
             </a:fld>
             <a:endParaRPr lang="en-US"/>
           </a:p>
@@ -1483,7 +1483,7 @@
           <a:p>
             <a:fld id="{477B3B45-EB55-46BF-8EE7-F91257854600}" type="datetimeFigureOut">
               <a:rPr lang="en-US" smtClean="0"/>
-              <a:t>5/9/2020</a:t>
+              <a:t>10/10/2020</a:t>
             </a:fld>
             <a:endParaRPr lang="en-US"/>
           </a:p>
@@ -1763,7 +1763,7 @@
           <a:p>
             <a:fld id="{477B3B45-EB55-46BF-8EE7-F91257854600}" type="datetimeFigureOut">
               <a:rPr lang="en-US" smtClean="0"/>
-              <a:t>5/9/2020</a:t>
+              <a:t>10/10/2020</a:t>
             </a:fld>
             <a:endParaRPr lang="en-US"/>
           </a:p>
@@ -2177,7 +2177,7 @@
           <a:p>
             <a:fld id="{477B3B45-EB55-46BF-8EE7-F91257854600}" type="datetimeFigureOut">
               <a:rPr lang="en-US" smtClean="0"/>
-              <a:t>5/9/2020</a:t>
+              <a:t>10/10/2020</a:t>
             </a:fld>
             <a:endParaRPr lang="en-US"/>
           </a:p>
@@ -2289,7 +2289,7 @@
           <a:p>
             <a:fld id="{477B3B45-EB55-46BF-8EE7-F91257854600}" type="datetimeFigureOut">
               <a:rPr lang="en-US" smtClean="0"/>
-              <a:t>5/9/2020</a:t>
+              <a:t>10/10/2020</a:t>
             </a:fld>
             <a:endParaRPr lang="en-US"/>
           </a:p>
@@ -2379,7 +2379,7 @@
           <a:p>
             <a:fld id="{477B3B45-EB55-46BF-8EE7-F91257854600}" type="datetimeFigureOut">
               <a:rPr lang="en-US" smtClean="0"/>
-              <a:t>5/9/2020</a:t>
+              <a:t>10/10/2020</a:t>
             </a:fld>
             <a:endParaRPr lang="en-US"/>
           </a:p>
@@ -2649,7 +2649,7 @@
           <a:p>
             <a:fld id="{477B3B45-EB55-46BF-8EE7-F91257854600}" type="datetimeFigureOut">
               <a:rPr lang="en-US" smtClean="0"/>
-              <a:t>5/9/2020</a:t>
+              <a:t>10/10/2020</a:t>
             </a:fld>
             <a:endParaRPr lang="en-US"/>
           </a:p>
@@ -2896,7 +2896,7 @@
           <a:p>
             <a:fld id="{477B3B45-EB55-46BF-8EE7-F91257854600}" type="datetimeFigureOut">
               <a:rPr lang="en-US" smtClean="0"/>
-              <a:t>5/9/2020</a:t>
+              <a:t>10/10/2020</a:t>
             </a:fld>
             <a:endParaRPr lang="en-US"/>
           </a:p>
@@ -3102,7 +3102,7 @@
           <a:p>
             <a:fld id="{477B3B45-EB55-46BF-8EE7-F91257854600}" type="datetimeFigureOut">
               <a:rPr lang="en-US" smtClean="0"/>
-              <a:t>5/9/2020</a:t>
+              <a:t>10/10/2020</a:t>
             </a:fld>
             <a:endParaRPr lang="en-US"/>
           </a:p>
@@ -4837,7 +4837,7 @@
         </p:nvSpPr>
         <p:spPr>
           <a:xfrm>
-            <a:off x="1155551" y="3352800"/>
+            <a:off x="1219200" y="3800707"/>
             <a:ext cx="2057400" cy="2057400"/>
           </a:xfrm>
           <a:prstGeom prst="roundRect">
@@ -4882,7 +4882,7 @@
                 </a:solidFill>
                 <a:latin typeface="Century" pitchFamily="18" charset="0"/>
               </a:rPr>
-              <a:t>?</a:t>
+              <a:t>F</a:t>
             </a:r>
           </a:p>
         </p:txBody>

</xml_diff>